<commit_message>
Removed temp files and added slides
</commit_message>
<xml_diff>
--- a/project_slides.pptx
+++ b/project_slides.pptx
@@ -5,10 +5,10 @@
     <p:sldMasterId id="2147483648" r:id="rId1"/>
   </p:sldMasterIdLst>
   <p:notesMasterIdLst>
-    <p:notesMasterId r:id="rId7"/>
+    <p:notesMasterId r:id="rId9"/>
   </p:notesMasterIdLst>
   <p:handoutMasterIdLst>
-    <p:handoutMasterId r:id="rId8"/>
+    <p:handoutMasterId r:id="rId10"/>
   </p:handoutMasterIdLst>
   <p:sldIdLst>
     <p:sldId id="277" r:id="rId2"/>
@@ -16,6 +16,8 @@
     <p:sldId id="278" r:id="rId4"/>
     <p:sldId id="279" r:id="rId5"/>
     <p:sldId id="268" r:id="rId6"/>
+    <p:sldId id="280" r:id="rId7"/>
+    <p:sldId id="281" r:id="rId8"/>
   </p:sldIdLst>
   <p:sldSz cx="12192000" cy="6858000"/>
   <p:notesSz cx="6858000" cy="9144000"/>
@@ -218,7 +220,7 @@
           <a:p>
             <a:fld id="{65DD71D7-55AC-46BD-81B3-09AB2F9EFBD8}" type="datetimeFigureOut">
               <a:rPr lang="en-US" smtClean="0"/>
-              <a:t>8/6/24</a:t>
+              <a:t>8/7/24</a:t>
             </a:fld>
             <a:endParaRPr lang="en-US"/>
           </a:p>
@@ -383,7 +385,7 @@
           <a:p>
             <a:fld id="{1F89424F-BB59-4F4E-9822-4CA3E770FFD2}" type="datetimeFigureOut">
               <a:rPr lang="en-US" smtClean="0"/>
-              <a:t>8/6/24</a:t>
+              <a:t>8/7/24</a:t>
             </a:fld>
             <a:endParaRPr lang="en-US"/>
           </a:p>
@@ -1011,7 +1013,7 @@
             <a:fld id="{C9872EE9-AF66-483C-961F-59B9F002993E}" type="datetime1">
               <a:rPr lang="en-US" smtClean="0"/>
               <a:pPr/>
-              <a:t>8/6/24</a:t>
+              <a:t>8/7/24</a:t>
             </a:fld>
             <a:endParaRPr lang="en-US" dirty="0"/>
           </a:p>
@@ -1205,7 +1207,7 @@
             <a:fld id="{C7BEAFD5-7FA3-40FB-875B-457FB46B25A4}" type="datetime1">
               <a:rPr lang="en-US" smtClean="0"/>
               <a:pPr/>
-              <a:t>8/6/24</a:t>
+              <a:t>8/7/24</a:t>
             </a:fld>
             <a:endParaRPr lang="en-US" dirty="0"/>
           </a:p>
@@ -1389,7 +1391,7 @@
             <a:fld id="{89AD63E2-E931-4653-BB33-A910E07D11B2}" type="datetime1">
               <a:rPr lang="en-US" smtClean="0"/>
               <a:pPr/>
-              <a:t>8/6/24</a:t>
+              <a:t>8/7/24</a:t>
             </a:fld>
             <a:endParaRPr lang="en-US" dirty="0"/>
           </a:p>
@@ -1937,7 +1939,7 @@
             <a:fld id="{C9EA1F43-559A-4B47-A959-EFB6142CA3A9}" type="datetime1">
               <a:rPr lang="en-US" smtClean="0"/>
               <a:pPr/>
-              <a:t>8/6/24</a:t>
+              <a:t>8/7/24</a:t>
             </a:fld>
             <a:endParaRPr lang="en-US" dirty="0"/>
           </a:p>
@@ -2384,7 +2386,7 @@
             <a:fld id="{F1261AED-24AE-4AC7-940D-F7106D2788A3}" type="datetime1">
               <a:rPr lang="en-US" smtClean="0"/>
               <a:pPr/>
-              <a:t>8/6/24</a:t>
+              <a:t>8/7/24</a:t>
             </a:fld>
             <a:endParaRPr lang="en-US" dirty="0"/>
           </a:p>
@@ -2517,7 +2519,7 @@
             <a:fld id="{EC425771-5E10-4A19-AB0E-909293152332}" type="datetime1">
               <a:rPr lang="en-US" smtClean="0"/>
               <a:pPr/>
-              <a:t>8/6/24</a:t>
+              <a:t>8/7/24</a:t>
             </a:fld>
             <a:endParaRPr lang="en-US" dirty="0"/>
           </a:p>
@@ -2628,7 +2630,7 @@
             <a:fld id="{03606FD5-B03F-45D5-A178-114C548C0032}" type="datetime1">
               <a:rPr lang="en-US" smtClean="0"/>
               <a:pPr/>
-              <a:t>8/6/24</a:t>
+              <a:t>8/7/24</a:t>
             </a:fld>
             <a:endParaRPr lang="en-US" dirty="0"/>
           </a:p>
@@ -3013,7 +3015,7 @@
             <a:fld id="{E8B012C0-B102-441D-AA86-2C80DFA84E68}" type="datetime1">
               <a:rPr lang="en-US" smtClean="0"/>
               <a:pPr/>
-              <a:t>8/6/24</a:t>
+              <a:t>8/7/24</a:t>
             </a:fld>
             <a:endParaRPr lang="en-US" dirty="0"/>
           </a:p>
@@ -3337,7 +3339,7 @@
             <a:fld id="{601E0B12-F9DE-47EF-A076-CF602073F1B2}" type="datetime1">
               <a:rPr lang="en-US" smtClean="0"/>
               <a:pPr/>
-              <a:t>8/6/24</a:t>
+              <a:t>8/7/24</a:t>
             </a:fld>
             <a:endParaRPr lang="en-US" dirty="0"/>
           </a:p>
@@ -3640,7 +3642,7 @@
             <a:fld id="{C8B93266-8FB4-430B-8AE3-3A53F50E1A0B}" type="datetime1">
               <a:rPr lang="en-US" smtClean="0"/>
               <a:pPr/>
-              <a:t>8/6/24</a:t>
+              <a:t>8/7/24</a:t>
             </a:fld>
             <a:endParaRPr lang="en-US" dirty="0"/>
           </a:p>
@@ -4459,9 +4461,6 @@
               <a:t>Optimize alignments through selection, crossover, and mutation.</a:t>
             </a:r>
           </a:p>
-          <a:p>
-            <a:endParaRPr lang="en-US" dirty="0"/>
-          </a:p>
         </p:txBody>
       </p:sp>
     </p:spTree>
@@ -4600,7 +4599,26 @@
             <a:pPr lvl="1"/>
             <a:r>
               <a:rPr lang="en-US" dirty="0"/>
-              <a:t>Evolving Alignments - selection, crossover, and mutation</a:t>
+              <a:t>Evolving Alignments - selection, crossover, and mutation, replacement </a:t>
+            </a:r>
+            <a:r>
+              <a:rPr lang="en-US"/>
+              <a:t>with elitism</a:t>
+            </a:r>
+            <a:endParaRPr lang="en-US" dirty="0"/>
+          </a:p>
+          <a:p>
+            <a:pPr lvl="1"/>
+            <a:r>
+              <a:rPr lang="en-US" dirty="0"/>
+              <a:t>Population Size – 200</a:t>
+            </a:r>
+          </a:p>
+          <a:p>
+            <a:pPr lvl="1"/>
+            <a:r>
+              <a:rPr lang="en-US" dirty="0"/>
+              <a:t>Generations - 2000</a:t>
             </a:r>
           </a:p>
           <a:p>
@@ -4707,14 +4725,14 @@
             <p:ph idx="1"/>
             <p:extLst>
               <p:ext uri="{D42A27DB-BD31-4B8C-83A1-F6EECF244321}">
-                <p14:modId xmlns:p14="http://schemas.microsoft.com/office/powerpoint/2010/main" val="2871093435"/>
+                <p14:modId xmlns:p14="http://schemas.microsoft.com/office/powerpoint/2010/main" val="1789273504"/>
               </p:ext>
             </p:extLst>
           </p:nvPr>
         </p:nvGraphicFramePr>
         <p:xfrm>
-          <a:off x="1295400" y="1828800"/>
-          <a:ext cx="9601200" cy="1483360"/>
+          <a:off x="1295400" y="1828799"/>
+          <a:ext cx="9601200" cy="2783396"/>
         </p:xfrm>
         <a:graphic>
           <a:graphicData uri="http://schemas.openxmlformats.org/drawingml/2006/table">
@@ -4738,12 +4756,13 @@
                   </a:extLst>
                 </a:gridCol>
               </a:tblGrid>
-              <a:tr h="370840">
+              <a:tr h="695849">
                 <a:tc>
                   <a:txBody>
                     <a:bodyPr/>
                     <a:lstStyle/>
                     <a:p>
+                      <a:pPr algn="ctr"/>
                       <a:r>
                         <a:rPr lang="en-US" dirty="0"/>
                         <a:t>Algorithm</a:t>
@@ -4757,6 +4776,7 @@
                     <a:bodyPr/>
                     <a:lstStyle/>
                     <a:p>
+                      <a:pPr algn="ctr"/>
                       <a:r>
                         <a:rPr lang="en-US" dirty="0"/>
                         <a:t>Total Alignment Score (BLOSUM-62 Matrix)</a:t>
@@ -4771,12 +4791,13 @@
                   </a:ext>
                 </a:extLst>
               </a:tr>
-              <a:tr h="370840">
+              <a:tr h="695849">
                 <a:tc>
                   <a:txBody>
                     <a:bodyPr/>
                     <a:lstStyle/>
                     <a:p>
+                      <a:pPr algn="ctr"/>
                       <a:r>
                         <a:rPr lang="en-US" dirty="0" err="1"/>
                         <a:t>ClustalW</a:t>
@@ -4791,6 +4812,7 @@
                     <a:bodyPr/>
                     <a:lstStyle/>
                     <a:p>
+                      <a:pPr algn="ctr"/>
                       <a:r>
                         <a:rPr lang="en-US" dirty="0"/>
                         <a:t>45,590.0</a:t>
@@ -4805,12 +4827,13 @@
                   </a:ext>
                 </a:extLst>
               </a:tr>
-              <a:tr h="370840">
+              <a:tr h="695849">
                 <a:tc>
                   <a:txBody>
                     <a:bodyPr/>
                     <a:lstStyle/>
                     <a:p>
+                      <a:pPr algn="ctr"/>
                       <a:r>
                         <a:rPr lang="en-US" dirty="0"/>
                         <a:t>MUSCLE</a:t>
@@ -4824,6 +4847,7 @@
                     <a:bodyPr/>
                     <a:lstStyle/>
                     <a:p>
+                      <a:pPr algn="ctr"/>
                       <a:r>
                         <a:rPr lang="en-US" dirty="0"/>
                         <a:t>49,117.0</a:t>
@@ -4838,14 +4862,15 @@
                   </a:ext>
                 </a:extLst>
               </a:tr>
-              <a:tr h="370840">
+              <a:tr h="695849">
                 <a:tc>
                   <a:txBody>
                     <a:bodyPr/>
                     <a:lstStyle/>
                     <a:p>
+                      <a:pPr algn="ctr"/>
                       <a:r>
-                        <a:rPr lang="en-US" dirty="0"/>
+                        <a:rPr lang="en-US" b="1" dirty="0"/>
                         <a:t>Genetic Algorithm </a:t>
                       </a:r>
                     </a:p>
@@ -4857,7 +4882,11 @@
                     <a:bodyPr/>
                     <a:lstStyle/>
                     <a:p>
-                      <a:endParaRPr lang="en-US" dirty="0"/>
+                      <a:pPr algn="ctr"/>
+                      <a:r>
+                        <a:rPr lang="en-US" b="1" dirty="0"/>
+                        <a:t>39,876.0</a:t>
+                      </a:r>
                     </a:p>
                   </a:txBody>
                   <a:tcPr/>
@@ -4876,6 +4905,268 @@
     <p:extLst>
       <p:ext uri="{BB962C8B-B14F-4D97-AF65-F5344CB8AC3E}">
         <p14:creationId xmlns:p14="http://schemas.microsoft.com/office/powerpoint/2010/main" val="579920876"/>
+      </p:ext>
+    </p:extLst>
+  </p:cSld>
+  <p:clrMapOvr>
+    <a:masterClrMapping/>
+  </p:clrMapOvr>
+  <mc:AlternateContent xmlns:mc="http://schemas.openxmlformats.org/markup-compatibility/2006" xmlns:p14="http://schemas.microsoft.com/office/powerpoint/2010/main">
+    <mc:Choice Requires="p14">
+      <p:transition spd="med" p14:dur="700">
+        <p:fade/>
+      </p:transition>
+    </mc:Choice>
+    <mc:Fallback xmlns="">
+      <p:transition spd="med">
+        <p:fade/>
+      </p:transition>
+    </mc:Fallback>
+  </mc:AlternateContent>
+</p:sld>
+</file>
+
+<file path=ppt/slides/slide6.xml><?xml version="1.0" encoding="utf-8"?>
+<p:sld xmlns:a="http://schemas.openxmlformats.org/drawingml/2006/main" xmlns:r="http://schemas.openxmlformats.org/officeDocument/2006/relationships" xmlns:p="http://schemas.openxmlformats.org/presentationml/2006/main">
+  <p:cSld>
+    <p:spTree>
+      <p:nvGrpSpPr>
+        <p:cNvPr id="1" name=""/>
+        <p:cNvGrpSpPr/>
+        <p:nvPr/>
+      </p:nvGrpSpPr>
+      <p:grpSpPr>
+        <a:xfrm>
+          <a:off x="0" y="0"/>
+          <a:ext cx="0" cy="0"/>
+          <a:chOff x="0" y="0"/>
+          <a:chExt cx="0" cy="0"/>
+        </a:xfrm>
+      </p:grpSpPr>
+      <p:sp>
+        <p:nvSpPr>
+          <p:cNvPr id="2" name="Title 1">
+            <a:extLst>
+              <a:ext uri="{FF2B5EF4-FFF2-40B4-BE49-F238E27FC236}">
+                <a16:creationId xmlns:a16="http://schemas.microsoft.com/office/drawing/2014/main" id="{B183531C-31C3-7967-8325-22C125882545}"/>
+              </a:ext>
+            </a:extLst>
+          </p:cNvPr>
+          <p:cNvSpPr>
+            <a:spLocks noGrp="1"/>
+          </p:cNvSpPr>
+          <p:nvPr>
+            <p:ph type="title"/>
+          </p:nvPr>
+        </p:nvSpPr>
+        <p:spPr>
+          <a:xfrm>
+            <a:off x="1295400" y="381000"/>
+            <a:ext cx="9601200" cy="1143000"/>
+          </a:xfrm>
+        </p:spPr>
+        <p:txBody>
+          <a:bodyPr anchor="b">
+            <a:normAutofit/>
+          </a:bodyPr>
+          <a:lstStyle/>
+          <a:p>
+            <a:r>
+              <a:rPr lang="en-US" dirty="0"/>
+              <a:t>Fitness graph</a:t>
+            </a:r>
+          </a:p>
+        </p:txBody>
+      </p:sp>
+      <p:pic>
+        <p:nvPicPr>
+          <p:cNvPr id="4" name="Picture 3" descr="A graph with a line drawn on it&#10;&#10;Description automatically generated">
+            <a:extLst>
+              <a:ext uri="{FF2B5EF4-FFF2-40B4-BE49-F238E27FC236}">
+                <a16:creationId xmlns:a16="http://schemas.microsoft.com/office/drawing/2014/main" id="{6A756B22-BEB0-874A-F985-465EACC51F00}"/>
+              </a:ext>
+            </a:extLst>
+          </p:cNvPr>
+          <p:cNvPicPr>
+            <a:picLocks noChangeAspect="1"/>
+          </p:cNvPicPr>
+          <p:nvPr/>
+        </p:nvPicPr>
+        <p:blipFill>
+          <a:blip r:embed="rId2">
+            <a:extLst>
+              <a:ext uri="{28A0092B-C50C-407E-A947-70E740481C1C}">
+                <a14:useLocalDpi xmlns:a14="http://schemas.microsoft.com/office/drawing/2010/main" val="0"/>
+              </a:ext>
+            </a:extLst>
+          </a:blip>
+          <a:stretch>
+            <a:fillRect/>
+          </a:stretch>
+        </p:blipFill>
+        <p:spPr>
+          <a:xfrm>
+            <a:off x="3248387" y="1828800"/>
+            <a:ext cx="5695225" cy="4114800"/>
+          </a:xfrm>
+          <a:prstGeom prst="rect">
+            <a:avLst/>
+          </a:prstGeom>
+          <a:noFill/>
+        </p:spPr>
+      </p:pic>
+    </p:spTree>
+    <p:extLst>
+      <p:ext uri="{BB962C8B-B14F-4D97-AF65-F5344CB8AC3E}">
+        <p14:creationId xmlns:p14="http://schemas.microsoft.com/office/powerpoint/2010/main" val="2632236850"/>
+      </p:ext>
+    </p:extLst>
+  </p:cSld>
+  <p:clrMapOvr>
+    <a:masterClrMapping/>
+  </p:clrMapOvr>
+  <mc:AlternateContent xmlns:mc="http://schemas.openxmlformats.org/markup-compatibility/2006" xmlns:p14="http://schemas.microsoft.com/office/powerpoint/2010/main">
+    <mc:Choice Requires="p14">
+      <p:transition spd="med" p14:dur="700">
+        <p:fade/>
+      </p:transition>
+    </mc:Choice>
+    <mc:Fallback xmlns="">
+      <p:transition spd="med">
+        <p:fade/>
+      </p:transition>
+    </mc:Fallback>
+  </mc:AlternateContent>
+</p:sld>
+</file>
+
+<file path=ppt/slides/slide7.xml><?xml version="1.0" encoding="utf-8"?>
+<p:sld xmlns:a="http://schemas.openxmlformats.org/drawingml/2006/main" xmlns:r="http://schemas.openxmlformats.org/officeDocument/2006/relationships" xmlns:p="http://schemas.openxmlformats.org/presentationml/2006/main">
+  <p:cSld>
+    <p:spTree>
+      <p:nvGrpSpPr>
+        <p:cNvPr id="1" name=""/>
+        <p:cNvGrpSpPr/>
+        <p:nvPr/>
+      </p:nvGrpSpPr>
+      <p:grpSpPr>
+        <a:xfrm>
+          <a:off x="0" y="0"/>
+          <a:ext cx="0" cy="0"/>
+          <a:chOff x="0" y="0"/>
+          <a:chExt cx="0" cy="0"/>
+        </a:xfrm>
+      </p:grpSpPr>
+      <p:sp>
+        <p:nvSpPr>
+          <p:cNvPr id="2" name="Title 1">
+            <a:extLst>
+              <a:ext uri="{FF2B5EF4-FFF2-40B4-BE49-F238E27FC236}">
+                <a16:creationId xmlns:a16="http://schemas.microsoft.com/office/drawing/2014/main" id="{614F37D9-35C0-7FE6-486A-BEBD2A2D3D3D}"/>
+              </a:ext>
+            </a:extLst>
+          </p:cNvPr>
+          <p:cNvSpPr>
+            <a:spLocks noGrp="1"/>
+          </p:cNvSpPr>
+          <p:nvPr>
+            <p:ph type="title"/>
+          </p:nvPr>
+        </p:nvSpPr>
+        <p:spPr/>
+        <p:txBody>
+          <a:bodyPr/>
+          <a:lstStyle/>
+          <a:p>
+            <a:r>
+              <a:rPr lang="en-US" dirty="0"/>
+              <a:t>Conclusion</a:t>
+            </a:r>
+          </a:p>
+        </p:txBody>
+      </p:sp>
+      <p:sp>
+        <p:nvSpPr>
+          <p:cNvPr id="3" name="Content Placeholder 2">
+            <a:extLst>
+              <a:ext uri="{FF2B5EF4-FFF2-40B4-BE49-F238E27FC236}">
+                <a16:creationId xmlns:a16="http://schemas.microsoft.com/office/drawing/2014/main" id="{69602239-DC98-EFCF-25CD-88D7A655E9DF}"/>
+              </a:ext>
+            </a:extLst>
+          </p:cNvPr>
+          <p:cNvSpPr>
+            <a:spLocks noGrp="1"/>
+          </p:cNvSpPr>
+          <p:nvPr>
+            <p:ph idx="1"/>
+          </p:nvPr>
+        </p:nvSpPr>
+        <p:spPr/>
+        <p:txBody>
+          <a:bodyPr/>
+          <a:lstStyle/>
+          <a:p>
+            <a:r>
+              <a:rPr lang="en-US" dirty="0"/>
+              <a:t>Genetic Algorithm produced a decent alignment score comparatively</a:t>
+            </a:r>
+          </a:p>
+          <a:p>
+            <a:r>
+              <a:rPr lang="en-US" dirty="0"/>
+              <a:t>Graph showed more room for convergence</a:t>
+            </a:r>
+          </a:p>
+          <a:p>
+            <a:r>
+              <a:rPr lang="en-US" dirty="0"/>
+              <a:t>Computation time was far greater for the Genetic Algorithm (hours compares to minutes)</a:t>
+            </a:r>
+          </a:p>
+          <a:p>
+            <a:r>
+              <a:rPr lang="en-US" b="1" dirty="0"/>
+              <a:t>Areas for improvement:</a:t>
+            </a:r>
+          </a:p>
+          <a:p>
+            <a:pPr lvl="1"/>
+            <a:r>
+              <a:rPr lang="en-US" dirty="0"/>
+              <a:t>Larger population size</a:t>
+            </a:r>
+          </a:p>
+          <a:p>
+            <a:pPr lvl="1"/>
+            <a:r>
+              <a:rPr lang="en-US" dirty="0"/>
+              <a:t>Run for more generations</a:t>
+            </a:r>
+          </a:p>
+          <a:p>
+            <a:pPr lvl="1"/>
+            <a:r>
+              <a:rPr lang="en-US" dirty="0"/>
+              <a:t>Efficiency improvement </a:t>
+            </a:r>
+          </a:p>
+          <a:p>
+            <a:pPr lvl="1"/>
+            <a:r>
+              <a:rPr lang="en-US" dirty="0"/>
+              <a:t>Dynamic parameter tuning</a:t>
+            </a:r>
+          </a:p>
+          <a:p>
+            <a:pPr lvl="1"/>
+            <a:endParaRPr lang="en-US" dirty="0"/>
+          </a:p>
+        </p:txBody>
+      </p:sp>
+    </p:spTree>
+    <p:extLst>
+      <p:ext uri="{BB962C8B-B14F-4D97-AF65-F5344CB8AC3E}">
+        <p14:creationId xmlns:p14="http://schemas.microsoft.com/office/powerpoint/2010/main" val="4040651725"/>
       </p:ext>
     </p:extLst>
   </p:cSld>

</xml_diff>